<commit_message>
Slight Mods from meeting
git-svn-id: http://svn.eol.ucar.edu/svn/raf/trunk/instruments/mtp@8229 640d5228-2204-0410-8d71-8f46fa6850b4
</commit_message>
<xml_diff>
--- a/doc/MTP Status 20160309.pptx
+++ b/doc/MTP Status 20160309.pptx
@@ -3225,11 +3225,7 @@
           <a:p>
             <a:r>
               <a:rPr lang="en-US" dirty="0" smtClean="0"/>
-              <a:t>Completed nomenclature </a:t>
-            </a:r>
-            <a:r>
-              <a:rPr lang="en-US" dirty="0" smtClean="0"/>
-              <a:t>document</a:t>
+              <a:t>Completed nomenclature document</a:t>
             </a:r>
           </a:p>
           <a:p>
@@ -3237,7 +3233,6 @@
               <a:rPr lang="en-US" dirty="0" smtClean="0"/>
               <a:t>Updated Gain document w/new info</a:t>
             </a:r>
-            <a:endParaRPr lang="en-US" dirty="0" smtClean="0"/>
           </a:p>
           <a:p>
             <a:r>
@@ -3361,7 +3356,7 @@
         <p:spPr/>
         <p:txBody>
           <a:bodyPr>
-            <a:normAutofit fontScale="92500" lnSpcReduction="10000"/>
+            <a:normAutofit fontScale="92500" lnSpcReduction="20000"/>
           </a:bodyPr>
           <a:lstStyle/>
           <a:p>
@@ -3426,7 +3421,19 @@
             <a:pPr lvl="1"/>
             <a:r>
               <a:rPr lang="en-US" dirty="0" smtClean="0"/>
-              <a:t>Only used to test against synthetic dataset, results were good</a:t>
+              <a:t>Only used to test against synthetic dataset, results were </a:t>
+            </a:r>
+            <a:r>
+              <a:rPr lang="en-US" dirty="0" smtClean="0"/>
+              <a:t>good</a:t>
+            </a:r>
+            <a:endParaRPr lang="en-US" dirty="0"/>
+          </a:p>
+          <a:p>
+            <a:pPr lvl="1"/>
+            <a:r>
+              <a:rPr lang="en-US" dirty="0" smtClean="0"/>
+              <a:t>They now have DEEPWAVE data against which to test</a:t>
             </a:r>
             <a:endParaRPr lang="en-US" dirty="0"/>
           </a:p>

</xml_diff>